<commit_message>
check p-value for nested components
</commit_message>
<xml_diff>
--- a/Nested ANOVA/summary/cfu analysis 07:14:2020.pptx
+++ b/Nested ANOVA/summary/cfu analysis 07:14:2020.pptx
@@ -3495,14 +3495,14 @@
           <p:nvPr>
             <p:extLst>
               <p:ext uri="{D42A27DB-BD31-4B8C-83A1-F6EECF244321}">
-                <p14:modId xmlns:p14="http://schemas.microsoft.com/office/powerpoint/2010/main" val="2259433437"/>
+                <p14:modId xmlns:p14="http://schemas.microsoft.com/office/powerpoint/2010/main" val="256974911"/>
               </p:ext>
             </p:extLst>
           </p:nvPr>
         </p:nvGraphicFramePr>
         <p:xfrm>
           <a:off x="6953586" y="1880241"/>
-          <a:ext cx="4660645" cy="2087880"/>
+          <a:ext cx="4978765" cy="2034197"/>
         </p:xfrm>
         <a:graphic>
           <a:graphicData uri="http://schemas.openxmlformats.org/drawingml/2006/table">
@@ -3511,35 +3511,35 @@
                 <a:tableStyleId>{5940675A-B579-460E-94D1-54222C63F5DA}</a:tableStyleId>
               </a:tblPr>
               <a:tblGrid>
-                <a:gridCol w="1472245">
+                <a:gridCol w="1580180">
                   <a:extLst>
                     <a:ext uri="{9D8B030D-6E8A-4147-A177-3AD203B41FA5}">
                       <a16:colId xmlns:a16="http://schemas.microsoft.com/office/drawing/2014/main" val="1956660310"/>
                     </a:ext>
                   </a:extLst>
                 </a:gridCol>
-                <a:gridCol w="697230">
+                <a:gridCol w="737376">
                   <a:extLst>
                     <a:ext uri="{9D8B030D-6E8A-4147-A177-3AD203B41FA5}">
                       <a16:colId xmlns:a16="http://schemas.microsoft.com/office/drawing/2014/main" val="3177861811"/>
                     </a:ext>
                   </a:extLst>
                 </a:gridCol>
-                <a:gridCol w="868680">
+                <a:gridCol w="927973">
                   <a:extLst>
                     <a:ext uri="{9D8B030D-6E8A-4147-A177-3AD203B41FA5}">
                       <a16:colId xmlns:a16="http://schemas.microsoft.com/office/drawing/2014/main" val="246451179"/>
                     </a:ext>
                   </a:extLst>
                 </a:gridCol>
-                <a:gridCol w="857250">
+                <a:gridCol w="915763">
                   <a:extLst>
                     <a:ext uri="{9D8B030D-6E8A-4147-A177-3AD203B41FA5}">
                       <a16:colId xmlns:a16="http://schemas.microsoft.com/office/drawing/2014/main" val="1105104521"/>
                     </a:ext>
                   </a:extLst>
                 </a:gridCol>
-                <a:gridCol w="765240">
+                <a:gridCol w="817473">
                   <a:extLst>
                     <a:ext uri="{9D8B030D-6E8A-4147-A177-3AD203B41FA5}">
                       <a16:colId xmlns:a16="http://schemas.microsoft.com/office/drawing/2014/main" val="1166878069"/>
@@ -4037,7 +4037,7 @@
         </p:nvSpPr>
         <p:spPr>
           <a:xfrm rot="16200000">
-            <a:off x="6096000" y="2629033"/>
+            <a:off x="6096000" y="2712673"/>
             <a:ext cx="1175706" cy="369332"/>
           </a:xfrm>
           <a:prstGeom prst="rect">
@@ -4816,14 +4816,14 @@
           <p:nvPr>
             <p:extLst>
               <p:ext uri="{D42A27DB-BD31-4B8C-83A1-F6EECF244321}">
-                <p14:modId xmlns:p14="http://schemas.microsoft.com/office/powerpoint/2010/main" val="2651006918"/>
+                <p14:modId xmlns:p14="http://schemas.microsoft.com/office/powerpoint/2010/main" val="3925343215"/>
               </p:ext>
             </p:extLst>
           </p:nvPr>
         </p:nvGraphicFramePr>
         <p:xfrm>
-          <a:off x="7151028" y="3144377"/>
-          <a:ext cx="3940796" cy="1737360"/>
+          <a:off x="7151027" y="3144377"/>
+          <a:ext cx="4616429" cy="1630680"/>
         </p:xfrm>
         <a:graphic>
           <a:graphicData uri="http://schemas.openxmlformats.org/drawingml/2006/table">
@@ -4832,34 +4832,41 @@
                 <a:tableStyleId>{5940675A-B579-460E-94D1-54222C63F5DA}</a:tableStyleId>
               </a:tblPr>
               <a:tblGrid>
-                <a:gridCol w="1601357">
+                <a:gridCol w="1566017">
                   <a:extLst>
                     <a:ext uri="{9D8B030D-6E8A-4147-A177-3AD203B41FA5}">
                       <a16:colId xmlns:a16="http://schemas.microsoft.com/office/drawing/2014/main" val="1956660310"/>
                     </a:ext>
                   </a:extLst>
                 </a:gridCol>
-                <a:gridCol w="779813">
+                <a:gridCol w="762603">
                   <a:extLst>
                     <a:ext uri="{9D8B030D-6E8A-4147-A177-3AD203B41FA5}">
                       <a16:colId xmlns:a16="http://schemas.microsoft.com/office/drawing/2014/main" val="3177861811"/>
                     </a:ext>
                   </a:extLst>
                 </a:gridCol>
-                <a:gridCol w="779813">
+                <a:gridCol w="762603">
                   <a:extLst>
                     <a:ext uri="{9D8B030D-6E8A-4147-A177-3AD203B41FA5}">
                       <a16:colId xmlns:a16="http://schemas.microsoft.com/office/drawing/2014/main" val="246451179"/>
                     </a:ext>
                   </a:extLst>
                 </a:gridCol>
-                <a:gridCol w="779813">
+                <a:gridCol w="762603">
                   <a:extLst>
                     <a:ext uri="{9D8B030D-6E8A-4147-A177-3AD203B41FA5}">
                       <a16:colId xmlns:a16="http://schemas.microsoft.com/office/drawing/2014/main" val="1105104521"/>
                     </a:ext>
                   </a:extLst>
                 </a:gridCol>
+                <a:gridCol w="762603">
+                  <a:extLst>
+                    <a:ext uri="{9D8B030D-6E8A-4147-A177-3AD203B41FA5}">
+                      <a16:colId xmlns:a16="http://schemas.microsoft.com/office/drawing/2014/main" val="1177135401"/>
+                    </a:ext>
+                  </a:extLst>
+                </a:gridCol>
               </a:tblGrid>
               <a:tr h="246452">
                 <a:tc>
@@ -4869,7 +4876,7 @@
                     <a:p>
                       <a:pPr algn="ctr"/>
                       <a:r>
-                        <a:rPr lang="en-US" sz="1200" b="1" dirty="0"/>
+                        <a:rPr lang="en-US" sz="1100" b="1" dirty="0"/>
                         <a:t>Variable Name</a:t>
                       </a:r>
                     </a:p>
@@ -4883,7 +4890,7 @@
                     <a:p>
                       <a:pPr algn="ctr"/>
                       <a:r>
-                        <a:rPr lang="en-US" sz="1200" b="1" dirty="0"/>
+                        <a:rPr lang="en-US" sz="1100" b="1" dirty="0"/>
                         <a:t>Estimate</a:t>
                       </a:r>
                     </a:p>
@@ -4897,7 +4904,7 @@
                     <a:p>
                       <a:pPr algn="ctr"/>
                       <a:r>
-                        <a:rPr lang="en-US" sz="1200" b="1" dirty="0"/>
+                        <a:rPr lang="en-US" sz="1100" b="1" dirty="0"/>
                         <a:t>Lower CI</a:t>
                       </a:r>
                     </a:p>
@@ -4911,8 +4918,22 @@
                     <a:p>
                       <a:pPr algn="ctr"/>
                       <a:r>
-                        <a:rPr lang="en-US" sz="1200" b="1" dirty="0"/>
+                        <a:rPr lang="en-US" sz="1100" b="1" dirty="0"/>
                         <a:t>Upper CI</a:t>
+                      </a:r>
+                    </a:p>
+                  </a:txBody>
+                  <a:tcPr anchor="ctr"/>
+                </a:tc>
+                <a:tc>
+                  <a:txBody>
+                    <a:bodyPr/>
+                    <a:lstStyle/>
+                    <a:p>
+                      <a:pPr algn="ctr"/>
+                      <a:r>
+                        <a:rPr lang="en-US" sz="1100" b="1" dirty="0"/>
+                        <a:t>p-value</a:t>
                       </a:r>
                     </a:p>
                   </a:txBody>
@@ -4931,7 +4952,7 @@
                     <a:lstStyle/>
                     <a:p>
                       <a:r>
-                        <a:rPr lang="en-US" sz="1200" dirty="0"/>
+                        <a:rPr lang="en-US" sz="1100" dirty="0"/>
                         <a:t>Intercept</a:t>
                       </a:r>
                     </a:p>
@@ -4945,8 +4966,8 @@
                     <a:p>
                       <a:pPr algn="r"/>
                       <a:r>
-                        <a:rPr lang="en-US" sz="1200" dirty="0"/>
-                        <a:t>30.000</a:t>
+                        <a:rPr lang="en-US" sz="1100" dirty="0"/>
+                        <a:t>30.705</a:t>
                       </a:r>
                     </a:p>
                   </a:txBody>
@@ -4959,7 +4980,7 @@
                     <a:p>
                       <a:pPr algn="r"/>
                       <a:r>
-                        <a:rPr lang="en-US" sz="1200" dirty="0"/>
+                        <a:rPr lang="en-US" sz="1100" dirty="0"/>
                         <a:t>16.306</a:t>
                       </a:r>
                     </a:p>
@@ -4973,8 +4994,22 @@
                     <a:p>
                       <a:pPr algn="r"/>
                       <a:r>
-                        <a:rPr lang="en-US" sz="1200" dirty="0"/>
+                        <a:rPr lang="en-US" sz="1100" dirty="0"/>
                         <a:t>45.300</a:t>
+                      </a:r>
+                    </a:p>
+                  </a:txBody>
+                  <a:tcPr anchor="ctr"/>
+                </a:tc>
+                <a:tc>
+                  <a:txBody>
+                    <a:bodyPr/>
+                    <a:lstStyle/>
+                    <a:p>
+                      <a:pPr algn="r"/>
+                      <a:r>
+                        <a:rPr lang="en-US" sz="1100" dirty="0"/>
+                        <a:t>6.31e-06</a:t>
                       </a:r>
                     </a:p>
                   </a:txBody>
@@ -4993,7 +5028,7 @@
                     <a:lstStyle/>
                     <a:p>
                       <a:r>
-                        <a:rPr lang="en-US" sz="1200" dirty="0">
+                        <a:rPr lang="en-US" sz="1100" dirty="0">
                           <a:solidFill>
                             <a:srgbClr val="FF0000"/>
                           </a:solidFill>
@@ -5011,12 +5046,12 @@
                     <a:p>
                       <a:pPr algn="r"/>
                       <a:r>
-                        <a:rPr lang="en-US" sz="1200" dirty="0">
+                        <a:rPr lang="en-US" sz="1100" dirty="0">
                           <a:solidFill>
                             <a:srgbClr val="FF0000"/>
                           </a:solidFill>
                         </a:rPr>
-                        <a:t>7.120</a:t>
+                        <a:t>7.127</a:t>
                       </a:r>
                     </a:p>
                   </a:txBody>
@@ -5029,7 +5064,7 @@
                     <a:p>
                       <a:pPr algn="r"/>
                       <a:r>
-                        <a:rPr lang="en-US" sz="1200" dirty="0">
+                        <a:rPr lang="en-US" sz="1100" dirty="0">
                           <a:solidFill>
                             <a:srgbClr val="FF0000"/>
                           </a:solidFill>
@@ -5047,12 +5082,30 @@
                     <a:p>
                       <a:pPr algn="r"/>
                       <a:r>
-                        <a:rPr lang="en-US" sz="1200" dirty="0">
+                        <a:rPr lang="en-US" sz="1100" dirty="0">
                           <a:solidFill>
                             <a:srgbClr val="FF0000"/>
                           </a:solidFill>
                         </a:rPr>
                         <a:t>21.920</a:t>
+                      </a:r>
+                    </a:p>
+                  </a:txBody>
+                  <a:tcPr anchor="ctr"/>
+                </a:tc>
+                <a:tc>
+                  <a:txBody>
+                    <a:bodyPr/>
+                    <a:lstStyle/>
+                    <a:p>
+                      <a:pPr algn="r"/>
+                      <a:r>
+                        <a:rPr lang="en-US" sz="1100" dirty="0">
+                          <a:solidFill>
+                            <a:srgbClr val="FF0000"/>
+                          </a:solidFill>
+                        </a:rPr>
+                        <a:t>0.3507 </a:t>
                       </a:r>
                     </a:p>
                   </a:txBody>
@@ -5071,7 +5124,7 @@
                     <a:lstStyle/>
                     <a:p>
                       <a:r>
-                        <a:rPr lang="en-US" sz="1200" dirty="0"/>
+                        <a:rPr lang="en-US" sz="1100" dirty="0"/>
                         <a:t>Male</a:t>
                       </a:r>
                     </a:p>
@@ -5085,8 +5138,8 @@
                     <a:p>
                       <a:pPr algn="r"/>
                       <a:r>
-                        <a:rPr lang="en-US" sz="1200" dirty="0"/>
-                        <a:t>- 17.445</a:t>
+                        <a:rPr lang="en-US" sz="1100" dirty="0"/>
+                        <a:t>-17.380</a:t>
                       </a:r>
                     </a:p>
                   </a:txBody>
@@ -5099,7 +5152,7 @@
                     <a:p>
                       <a:pPr algn="r"/>
                       <a:r>
-                        <a:rPr lang="en-US" sz="1200" dirty="0"/>
+                        <a:rPr lang="en-US" sz="1100" dirty="0"/>
                         <a:t>- 32.242</a:t>
                       </a:r>
                     </a:p>
@@ -5113,8 +5166,22 @@
                     <a:p>
                       <a:pPr algn="r"/>
                       <a:r>
-                        <a:rPr lang="en-US" sz="1200" dirty="0"/>
+                        <a:rPr lang="en-US" sz="1100" dirty="0"/>
                         <a:t>- 2.643</a:t>
+                      </a:r>
+                    </a:p>
+                  </a:txBody>
+                  <a:tcPr anchor="ctr"/>
+                </a:tc>
+                <a:tc>
+                  <a:txBody>
+                    <a:bodyPr/>
+                    <a:lstStyle/>
+                    <a:p>
+                      <a:pPr algn="r"/>
+                      <a:r>
+                        <a:rPr lang="en-US" sz="1100" dirty="0"/>
+                        <a:t> 0.0236 </a:t>
                       </a:r>
                     </a:p>
                   </a:txBody>
@@ -5127,17 +5194,17 @@
                 </a:extLst>
               </a:tr>
               <a:tr h="246452">
-                <a:tc gridSpan="4">
-                  <a:txBody>
-                    <a:bodyPr/>
-                    <a:lstStyle/>
-                    <a:p>
-                      <a:r>
-                        <a:rPr lang="en-US" sz="1200" b="1" dirty="0"/>
+                <a:tc gridSpan="5">
+                  <a:txBody>
+                    <a:bodyPr/>
+                    <a:lstStyle/>
+                    <a:p>
+                      <a:r>
+                        <a:rPr lang="en-US" sz="1100" b="1" dirty="0"/>
                         <a:t>Conclusion: </a:t>
                       </a:r>
                       <a:r>
-                        <a:rPr lang="en-US" sz="1200" b="0" dirty="0"/>
+                        <a:rPr lang="en-US" sz="1100" b="0" dirty="0"/>
                         <a:t>only sex is statistically significant </a:t>
                       </a:r>
                     </a:p>
@@ -5147,7 +5214,7 @@
                         <a:buChar char="•"/>
                       </a:pPr>
                       <a:r>
-                        <a:rPr lang="en-US" sz="1200" b="0" dirty="0">
+                        <a:rPr lang="en-US" sz="1100" b="0" dirty="0">
                           <a:solidFill>
                             <a:srgbClr val="FF0000"/>
                           </a:solidFill>
@@ -5161,7 +5228,7 @@
                         <a:buChar char="•"/>
                       </a:pPr>
                       <a:r>
-                        <a:rPr lang="en-US" sz="1200" b="0" dirty="0"/>
+                        <a:rPr lang="en-US" sz="1100" b="0" dirty="0"/>
                         <a:t>Sex male &lt; female </a:t>
                       </a:r>
                     </a:p>
@@ -5197,6 +5264,20 @@
                     <a:p>
                       <a:pPr algn="r"/>
                       <a:endParaRPr lang="en-US" sz="1200" dirty="0"/>
+                    </a:p>
+                  </a:txBody>
+                  <a:tcPr anchor="ctr"/>
+                </a:tc>
+                <a:tc hMerge="1">
+                  <a:txBody>
+                    <a:bodyPr/>
+                    <a:lstStyle/>
+                    <a:p>
+                      <a:pPr marL="171450" indent="-171450">
+                        <a:buFont typeface="Arial" panose="020B0604020202020204" pitchFamily="34" charset="0"/>
+                        <a:buChar char="•"/>
+                      </a:pPr>
+                      <a:endParaRPr lang="en-US" sz="1100" b="0" dirty="0"/>
                     </a:p>
                   </a:txBody>
                   <a:tcPr anchor="ctr"/>

</xml_diff>